<commit_message>
Update Solutions d’une équation aux valeurs propres.pptx
</commit_message>
<xml_diff>
--- a/Solutions d’une équation aux valeurs propres.pptx
+++ b/Solutions d’une équation aux valeurs propres.pptx
@@ -22,20 +22,21 @@
     <p:sldId id="273" r:id="rId16"/>
     <p:sldId id="274" r:id="rId17"/>
     <p:sldId id="278" r:id="rId18"/>
-    <p:sldId id="275" r:id="rId19"/>
-    <p:sldId id="276" r:id="rId20"/>
-    <p:sldId id="277" r:id="rId21"/>
-    <p:sldId id="282" r:id="rId22"/>
-    <p:sldId id="283" r:id="rId23"/>
-    <p:sldId id="284" r:id="rId24"/>
-    <p:sldId id="285" r:id="rId25"/>
-    <p:sldId id="286" r:id="rId26"/>
-    <p:sldId id="261" r:id="rId27"/>
-    <p:sldId id="264" r:id="rId28"/>
-    <p:sldId id="279" r:id="rId29"/>
-    <p:sldId id="280" r:id="rId30"/>
-    <p:sldId id="266" r:id="rId31"/>
-    <p:sldId id="281" r:id="rId32"/>
+    <p:sldId id="287" r:id="rId19"/>
+    <p:sldId id="275" r:id="rId20"/>
+    <p:sldId id="276" r:id="rId21"/>
+    <p:sldId id="277" r:id="rId22"/>
+    <p:sldId id="282" r:id="rId23"/>
+    <p:sldId id="283" r:id="rId24"/>
+    <p:sldId id="284" r:id="rId25"/>
+    <p:sldId id="285" r:id="rId26"/>
+    <p:sldId id="286" r:id="rId27"/>
+    <p:sldId id="261" r:id="rId28"/>
+    <p:sldId id="264" r:id="rId29"/>
+    <p:sldId id="279" r:id="rId30"/>
+    <p:sldId id="280" r:id="rId31"/>
+    <p:sldId id="266" r:id="rId32"/>
+    <p:sldId id="281" r:id="rId33"/>
   </p:sldIdLst>
   <p:sldSz cx="12192000" cy="6858000"/>
   <p:notesSz cx="6858000" cy="9144000"/>
@@ -685,7 +686,7 @@
           <a:p>
             <a:fld id="{34B7E4EF-A1BD-40F4-AB7B-04F084DD991D}" type="slidenum">
               <a:rPr lang="en-US" smtClean="0"/>
-              <a:t>‹N°›</a:t>
+              <a:t>‹#›</a:t>
             </a:fld>
             <a:endParaRPr lang="en-US" dirty="0"/>
           </a:p>
@@ -855,7 +856,7 @@
           <a:p>
             <a:fld id="{34B7E4EF-A1BD-40F4-AB7B-04F084DD991D}" type="slidenum">
               <a:rPr lang="en-US" smtClean="0"/>
-              <a:t>‹N°›</a:t>
+              <a:t>‹#›</a:t>
             </a:fld>
             <a:endParaRPr lang="en-US"/>
           </a:p>
@@ -1035,7 +1036,7 @@
           <a:p>
             <a:fld id="{34B7E4EF-A1BD-40F4-AB7B-04F084DD991D}" type="slidenum">
               <a:rPr lang="en-US" smtClean="0"/>
-              <a:t>‹N°›</a:t>
+              <a:t>‹#›</a:t>
             </a:fld>
             <a:endParaRPr lang="en-US"/>
           </a:p>
@@ -1205,7 +1206,7 @@
           <a:p>
             <a:fld id="{34B7E4EF-A1BD-40F4-AB7B-04F084DD991D}" type="slidenum">
               <a:rPr lang="en-US" smtClean="0"/>
-              <a:t>‹N°›</a:t>
+              <a:t>‹#›</a:t>
             </a:fld>
             <a:endParaRPr lang="en-US"/>
           </a:p>
@@ -1836,7 +1837,7 @@
           <a:p>
             <a:fld id="{34B7E4EF-A1BD-40F4-AB7B-04F084DD991D}" type="slidenum">
               <a:rPr lang="en-US" smtClean="0"/>
-              <a:t>‹N°›</a:t>
+              <a:t>‹#›</a:t>
             </a:fld>
             <a:endParaRPr lang="en-US" dirty="0"/>
           </a:p>
@@ -2124,7 +2125,7 @@
           <a:p>
             <a:fld id="{34B7E4EF-A1BD-40F4-AB7B-04F084DD991D}" type="slidenum">
               <a:rPr lang="en-US" smtClean="0"/>
-              <a:t>‹N°›</a:t>
+              <a:t>‹#›</a:t>
             </a:fld>
             <a:endParaRPr lang="en-US"/>
           </a:p>
@@ -2559,7 +2560,7 @@
           <a:p>
             <a:fld id="{34B7E4EF-A1BD-40F4-AB7B-04F084DD991D}" type="slidenum">
               <a:rPr lang="en-US" smtClean="0"/>
-              <a:t>‹N°›</a:t>
+              <a:t>‹#›</a:t>
             </a:fld>
             <a:endParaRPr lang="en-US"/>
           </a:p>
@@ -2677,7 +2678,7 @@
           <a:p>
             <a:fld id="{34B7E4EF-A1BD-40F4-AB7B-04F084DD991D}" type="slidenum">
               <a:rPr lang="en-US" smtClean="0"/>
-              <a:t>‹N°›</a:t>
+              <a:t>‹#›</a:t>
             </a:fld>
             <a:endParaRPr lang="en-US"/>
           </a:p>
@@ -2772,7 +2773,7 @@
           <a:p>
             <a:fld id="{34B7E4EF-A1BD-40F4-AB7B-04F084DD991D}" type="slidenum">
               <a:rPr lang="en-US" smtClean="0"/>
-              <a:t>‹N°›</a:t>
+              <a:t>‹#›</a:t>
             </a:fld>
             <a:endParaRPr lang="en-US"/>
           </a:p>
@@ -3214,7 +3215,7 @@
           <a:p>
             <a:fld id="{34B7E4EF-A1BD-40F4-AB7B-04F084DD991D}" type="slidenum">
               <a:rPr lang="en-US" smtClean="0"/>
-              <a:t>‹N°›</a:t>
+              <a:t>‹#›</a:t>
             </a:fld>
             <a:endParaRPr lang="en-US"/>
           </a:p>
@@ -3480,7 +3481,7 @@
           <a:p>
             <a:fld id="{34B7E4EF-A1BD-40F4-AB7B-04F084DD991D}" type="slidenum">
               <a:rPr lang="en-US" smtClean="0"/>
-              <a:t>‹N°›</a:t>
+              <a:t>‹#›</a:t>
             </a:fld>
             <a:endParaRPr lang="en-US"/>
           </a:p>
@@ -4005,7 +4006,7 @@
           <a:p>
             <a:fld id="{34B7E4EF-A1BD-40F4-AB7B-04F084DD991D}" type="slidenum">
               <a:rPr lang="en-US" smtClean="0"/>
-              <a:t>‹N°›</a:t>
+              <a:t>‹#›</a:t>
             </a:fld>
             <a:endParaRPr lang="en-US"/>
           </a:p>
@@ -7244,7 +7245,7 @@
           <p:cNvPr id="2" name="Titre 1">
             <a:extLst>
               <a:ext uri="{FF2B5EF4-FFF2-40B4-BE49-F238E27FC236}">
-                <a16:creationId xmlns:a16="http://schemas.microsoft.com/office/drawing/2014/main" id="{42734EF5-0052-43BE-9824-A13878B90F1F}"/>
+                <a16:creationId xmlns:a16="http://schemas.microsoft.com/office/drawing/2014/main" id="{AE66BF5C-AB32-48B1-89CF-28E9CD908DFE}"/>
               </a:ext>
             </a:extLst>
           </p:cNvPr>
@@ -7260,49 +7261,385 @@
           <a:bodyPr/>
           <a:lstStyle/>
           <a:p>
-            <a:endParaRPr lang="fr-CA"/>
-          </a:p>
-        </p:txBody>
-      </p:sp>
-      <p:pic>
-        <p:nvPicPr>
-          <p:cNvPr id="5" name="Espace réservé du contenu 4" descr="Une image contenant capture d’écran&#10;&#10;Description générée automatiquement">
-            <a:extLst>
-              <a:ext uri="{FF2B5EF4-FFF2-40B4-BE49-F238E27FC236}">
-                <a16:creationId xmlns:a16="http://schemas.microsoft.com/office/drawing/2014/main" id="{96765797-F901-483F-9638-B2E77ABA9C93}"/>
-              </a:ext>
-            </a:extLst>
-          </p:cNvPr>
-          <p:cNvPicPr>
-            <a:picLocks noGrp="1" noChangeAspect="1"/>
-          </p:cNvPicPr>
-          <p:nvPr>
-            <p:ph idx="1"/>
-          </p:nvPr>
-        </p:nvPicPr>
-        <p:blipFill>
-          <a:blip r:embed="rId2">
-            <a:extLst>
-              <a:ext uri="{28A0092B-C50C-407E-A947-70E740481C1C}">
-                <a14:useLocalDpi xmlns:a14="http://schemas.microsoft.com/office/drawing/2010/main" val="0"/>
-              </a:ext>
-            </a:extLst>
-          </a:blip>
-          <a:stretch>
-            <a:fillRect/>
-          </a:stretch>
-        </p:blipFill>
-        <p:spPr>
-          <a:xfrm>
-            <a:off x="420617" y="406399"/>
-            <a:ext cx="11371334" cy="6054361"/>
-          </a:xfrm>
-        </p:spPr>
-      </p:pic>
+            <a:r>
+              <a:rPr lang="fr-CA" dirty="0"/>
+              <a:t>Itérations de quotients de Rayleigh</a:t>
+            </a:r>
+          </a:p>
+        </p:txBody>
+      </p:sp>
+      <mc:AlternateContent xmlns:mc="http://schemas.openxmlformats.org/markup-compatibility/2006">
+        <mc:Choice xmlns:a14="http://schemas.microsoft.com/office/drawing/2010/main" Requires="a14">
+          <p:sp>
+            <p:nvSpPr>
+              <p:cNvPr id="3" name="TextBox 2">
+                <a:extLst>
+                  <a:ext uri="{FF2B5EF4-FFF2-40B4-BE49-F238E27FC236}">
+                    <a16:creationId xmlns:a16="http://schemas.microsoft.com/office/drawing/2014/main" id="{E2E9A118-3816-40DD-9360-5FA4238B4DFF}"/>
+                  </a:ext>
+                </a:extLst>
+              </p:cNvPr>
+              <p:cNvSpPr txBox="1"/>
+              <p:nvPr/>
+            </p:nvSpPr>
+            <p:spPr>
+              <a:xfrm>
+                <a:off x="1066799" y="1778466"/>
+                <a:ext cx="10166059" cy="2308324"/>
+              </a:xfrm>
+              <a:prstGeom prst="rect">
+                <a:avLst/>
+              </a:prstGeom>
+              <a:noFill/>
+            </p:spPr>
+            <p:txBody>
+              <a:bodyPr wrap="square" rtlCol="0">
+                <a:spAutoFit/>
+              </a:bodyPr>
+              <a:lstStyle/>
+              <a:p>
+                <a:pPr marL="285750" indent="-285750">
+                  <a:buFont typeface="Arial" panose="020B0604020202020204" pitchFamily="34" charset="0"/>
+                  <a:buChar char="•"/>
+                </a:pPr>
+                <a:r>
+                  <a:rPr lang="fr-CA" dirty="0"/>
+                  <a:t>Quotient de Rayleigh: produit scalaire d’un vecteur avec soi-même suite à l’application d’une matrice</a:t>
+                </a:r>
+              </a:p>
+              <a:p>
+                <a:pPr marL="285750" indent="-285750">
+                  <a:buFont typeface="Arial" panose="020B0604020202020204" pitchFamily="34" charset="0"/>
+                  <a:buChar char="•"/>
+                </a:pPr>
+                <a:endParaRPr lang="fr-CA" dirty="0"/>
+              </a:p>
+              <a:p>
+                <a:pPr marL="285750" indent="-285750">
+                  <a:buFont typeface="Arial" panose="020B0604020202020204" pitchFamily="34" charset="0"/>
+                  <a:buChar char="•"/>
+                </a:pPr>
+                <a:r>
+                  <a:rPr lang="fr-CA" dirty="0"/>
+                  <a:t>Itérations de puissances: appliquer la matrice sur un vecteur et le normaliser, puis recommencer. À la fin, trouve la valeur propre (quotient de Rayleigh). Converge vers plus haute valeur propre</a:t>
+                </a:r>
+              </a:p>
+              <a:p>
+                <a:pPr marL="285750" indent="-285750">
+                  <a:buFont typeface="Arial" panose="020B0604020202020204" pitchFamily="34" charset="0"/>
+                  <a:buChar char="•"/>
+                </a:pPr>
+                <a:endParaRPr lang="fr-CA" dirty="0"/>
+              </a:p>
+              <a:p>
+                <a:pPr marL="285750" indent="-285750">
+                  <a:buFont typeface="Arial" panose="020B0604020202020204" pitchFamily="34" charset="0"/>
+                  <a:buChar char="•"/>
+                </a:pPr>
+                <a:r>
+                  <a:rPr lang="en-CA" dirty="0" err="1"/>
+                  <a:t>Itérations</a:t>
+                </a:r>
+                <a:r>
+                  <a:rPr lang="en-CA" dirty="0"/>
+                  <a:t> inverses: appliquer </a:t>
+                </a:r>
+                <a14:m>
+                  <m:oMath xmlns:m="http://schemas.openxmlformats.org/officeDocument/2006/math">
+                    <m:sSup>
+                      <m:sSupPr>
+                        <m:ctrlPr>
+                          <a:rPr lang="fr-CA" b="0" i="1" smtClean="0">
+                            <a:latin typeface="Cambria Math" panose="02040503050406030204" pitchFamily="18" charset="0"/>
+                          </a:rPr>
+                        </m:ctrlPr>
+                      </m:sSupPr>
+                      <m:e>
+                        <m:r>
+                          <a:rPr lang="fr-CA">
+                            <a:latin typeface="Cambria Math" panose="02040503050406030204" pitchFamily="18" charset="0"/>
+                          </a:rPr>
+                          <m:t>(</m:t>
+                        </m:r>
+                        <m:r>
+                          <m:rPr>
+                            <m:sty m:val="p"/>
+                          </m:rPr>
+                          <a:rPr lang="fr-CA">
+                            <a:latin typeface="Cambria Math" panose="02040503050406030204" pitchFamily="18" charset="0"/>
+                          </a:rPr>
+                          <m:t>M</m:t>
+                        </m:r>
+                        <m:r>
+                          <a:rPr lang="fr-CA">
+                            <a:latin typeface="Cambria Math" panose="02040503050406030204" pitchFamily="18" charset="0"/>
+                          </a:rPr>
+                          <m:t>−</m:t>
+                        </m:r>
+                        <m:r>
+                          <a:rPr lang="fr-CA" i="1">
+                            <a:latin typeface="Cambria Math" panose="02040503050406030204" pitchFamily="18" charset="0"/>
+                          </a:rPr>
+                          <m:t>𝜆</m:t>
+                        </m:r>
+                        <m:r>
+                          <a:rPr lang="fr-CA" i="1">
+                            <a:latin typeface="Cambria Math" panose="02040503050406030204" pitchFamily="18" charset="0"/>
+                          </a:rPr>
+                          <m:t>𝐼</m:t>
+                        </m:r>
+                        <m:r>
+                          <a:rPr lang="fr-CA" i="1">
+                            <a:latin typeface="Cambria Math" panose="02040503050406030204" pitchFamily="18" charset="0"/>
+                          </a:rPr>
+                          <m:t>)</m:t>
+                        </m:r>
+                      </m:e>
+                      <m:sup>
+                        <m:r>
+                          <a:rPr lang="fr-CA" b="0" i="1" smtClean="0">
+                            <a:latin typeface="Cambria Math" panose="02040503050406030204" pitchFamily="18" charset="0"/>
+                          </a:rPr>
+                          <m:t>−1</m:t>
+                        </m:r>
+                      </m:sup>
+                    </m:sSup>
+                  </m:oMath>
+                </a14:m>
+                <a:r>
+                  <a:rPr lang="en-CA" dirty="0"/>
+                  <a:t> à la place. Converge </a:t>
+                </a:r>
+                <a:r>
+                  <a:rPr lang="en-CA" dirty="0" err="1"/>
+                  <a:t>vers</a:t>
+                </a:r>
+                <a:r>
+                  <a:rPr lang="en-CA" dirty="0"/>
+                  <a:t> </a:t>
+                </a:r>
+                <a:r>
+                  <a:rPr lang="en-CA" dirty="0" err="1"/>
+                  <a:t>valeur</a:t>
+                </a:r>
+                <a:r>
+                  <a:rPr lang="en-CA" dirty="0"/>
+                  <a:t> </a:t>
+                </a:r>
+                <a:r>
+                  <a:rPr lang="en-CA" dirty="0" err="1"/>
+                  <a:t>propre</a:t>
+                </a:r>
+                <a:r>
+                  <a:rPr lang="en-CA" dirty="0"/>
+                  <a:t> la plus </a:t>
+                </a:r>
+                <a:r>
+                  <a:rPr lang="en-CA" dirty="0" err="1"/>
+                  <a:t>proche</a:t>
+                </a:r>
+                <a:r>
+                  <a:rPr lang="en-CA" dirty="0"/>
+                  <a:t> de </a:t>
+                </a:r>
+                <a14:m>
+                  <m:oMath xmlns:m="http://schemas.openxmlformats.org/officeDocument/2006/math">
+                    <m:r>
+                      <a:rPr lang="fr-CA" i="1">
+                        <a:latin typeface="Cambria Math" panose="02040503050406030204" pitchFamily="18" charset="0"/>
+                      </a:rPr>
+                      <m:t>𝜆</m:t>
+                    </m:r>
+                  </m:oMath>
+                </a14:m>
+                <a:endParaRPr lang="en-CA" dirty="0"/>
+              </a:p>
+              <a:p>
+                <a:pPr marL="285750" indent="-285750">
+                  <a:buFont typeface="Arial" panose="020B0604020202020204" pitchFamily="34" charset="0"/>
+                  <a:buChar char="•"/>
+                </a:pPr>
+                <a:endParaRPr lang="en-CA" dirty="0"/>
+              </a:p>
+              <a:p>
+                <a:pPr marL="285750" indent="-285750">
+                  <a:buFont typeface="Arial" panose="020B0604020202020204" pitchFamily="34" charset="0"/>
+                  <a:buChar char="•"/>
+                </a:pPr>
+                <a:r>
+                  <a:rPr lang="en-CA" dirty="0" err="1"/>
+                  <a:t>Itérations</a:t>
+                </a:r>
+                <a:r>
+                  <a:rPr lang="en-CA" dirty="0"/>
+                  <a:t> de quotients de Rayleigh: applique</a:t>
+                </a:r>
+                <a:r>
+                  <a:rPr lang="fr-CA" dirty="0"/>
+                  <a:t> </a:t>
+                </a:r>
+                <a14:m>
+                  <m:oMath xmlns:m="http://schemas.openxmlformats.org/officeDocument/2006/math">
+                    <m:sSup>
+                      <m:sSupPr>
+                        <m:ctrlPr>
+                          <a:rPr lang="fr-CA" i="1">
+                            <a:latin typeface="Cambria Math" panose="02040503050406030204" pitchFamily="18" charset="0"/>
+                          </a:rPr>
+                        </m:ctrlPr>
+                      </m:sSupPr>
+                      <m:e>
+                        <m:r>
+                          <a:rPr lang="fr-CA">
+                            <a:latin typeface="Cambria Math" panose="02040503050406030204" pitchFamily="18" charset="0"/>
+                          </a:rPr>
+                          <m:t>(</m:t>
+                        </m:r>
+                        <m:r>
+                          <m:rPr>
+                            <m:sty m:val="p"/>
+                          </m:rPr>
+                          <a:rPr lang="fr-CA">
+                            <a:latin typeface="Cambria Math" panose="02040503050406030204" pitchFamily="18" charset="0"/>
+                          </a:rPr>
+                          <m:t>M</m:t>
+                        </m:r>
+                        <m:r>
+                          <a:rPr lang="fr-CA">
+                            <a:latin typeface="Cambria Math" panose="02040503050406030204" pitchFamily="18" charset="0"/>
+                          </a:rPr>
+                          <m:t>−</m:t>
+                        </m:r>
+                        <m:r>
+                          <a:rPr lang="fr-CA" i="1">
+                            <a:latin typeface="Cambria Math" panose="02040503050406030204" pitchFamily="18" charset="0"/>
+                          </a:rPr>
+                          <m:t>𝜆</m:t>
+                        </m:r>
+                        <m:r>
+                          <a:rPr lang="fr-CA" i="1">
+                            <a:latin typeface="Cambria Math" panose="02040503050406030204" pitchFamily="18" charset="0"/>
+                          </a:rPr>
+                          <m:t>𝐼</m:t>
+                        </m:r>
+                        <m:r>
+                          <a:rPr lang="fr-CA" i="1">
+                            <a:latin typeface="Cambria Math" panose="02040503050406030204" pitchFamily="18" charset="0"/>
+                          </a:rPr>
+                          <m:t>)</m:t>
+                        </m:r>
+                      </m:e>
+                      <m:sup>
+                        <m:r>
+                          <a:rPr lang="fr-CA" i="1">
+                            <a:latin typeface="Cambria Math" panose="02040503050406030204" pitchFamily="18" charset="0"/>
+                          </a:rPr>
+                          <m:t>−1</m:t>
+                        </m:r>
+                      </m:sup>
+                    </m:sSup>
+                  </m:oMath>
+                </a14:m>
+                <a:r>
+                  <a:rPr lang="en-CA" dirty="0"/>
+                  <a:t>, </a:t>
+                </a:r>
+                <a:r>
+                  <a:rPr lang="en-CA" dirty="0" err="1"/>
+                  <a:t>mais</a:t>
+                </a:r>
+                <a:r>
+                  <a:rPr lang="en-CA" dirty="0"/>
+                  <a:t> </a:t>
+                </a:r>
+                <a:r>
+                  <a:rPr lang="en-CA" dirty="0" err="1"/>
+                  <a:t>recalcule</a:t>
+                </a:r>
+                <a:r>
+                  <a:rPr lang="en-CA" dirty="0"/>
+                  <a:t> </a:t>
+                </a:r>
+                <a14:m>
+                  <m:oMath xmlns:m="http://schemas.openxmlformats.org/officeDocument/2006/math">
+                    <m:r>
+                      <a:rPr lang="fr-CA" i="1">
+                        <a:latin typeface="Cambria Math" panose="02040503050406030204" pitchFamily="18" charset="0"/>
+                      </a:rPr>
+                      <m:t>𝜆</m:t>
+                    </m:r>
+                  </m:oMath>
+                </a14:m>
+                <a:r>
+                  <a:rPr lang="en-CA" dirty="0"/>
+                  <a:t> à </a:t>
+                </a:r>
+                <a:r>
+                  <a:rPr lang="en-CA" dirty="0" err="1"/>
+                  <a:t>chaque</a:t>
+                </a:r>
+                <a:r>
+                  <a:rPr lang="en-CA" dirty="0"/>
+                  <a:t> </a:t>
+                </a:r>
+                <a:r>
+                  <a:rPr lang="en-CA" dirty="0" err="1"/>
+                  <a:t>étape</a:t>
+                </a:r>
+                <a:endParaRPr lang="en-CA" dirty="0"/>
+              </a:p>
+            </p:txBody>
+          </p:sp>
+        </mc:Choice>
+        <mc:Fallback>
+          <p:sp>
+            <p:nvSpPr>
+              <p:cNvPr id="3" name="TextBox 2">
+                <a:extLst>
+                  <a:ext uri="{FF2B5EF4-FFF2-40B4-BE49-F238E27FC236}">
+                    <a16:creationId xmlns:a16="http://schemas.microsoft.com/office/drawing/2014/main" id="{E2E9A118-3816-40DD-9360-5FA4238B4DFF}"/>
+                  </a:ext>
+                </a:extLst>
+              </p:cNvPr>
+              <p:cNvSpPr txBox="1">
+                <a:spLocks noRot="1" noChangeAspect="1" noMove="1" noResize="1" noEditPoints="1" noAdjustHandles="1" noChangeArrowheads="1" noChangeShapeType="1" noTextEdit="1"/>
+              </p:cNvSpPr>
+              <p:nvPr/>
+            </p:nvSpPr>
+            <p:spPr>
+              <a:xfrm>
+                <a:off x="1066799" y="1778466"/>
+                <a:ext cx="10166059" cy="2308324"/>
+              </a:xfrm>
+              <a:prstGeom prst="rect">
+                <a:avLst/>
+              </a:prstGeom>
+              <a:blipFill>
+                <a:blip r:embed="rId2"/>
+                <a:stretch>
+                  <a:fillRect l="-360" t="-1323" r="-180" b="-3704"/>
+                </a:stretch>
+              </a:blipFill>
+            </p:spPr>
+            <p:txBody>
+              <a:bodyPr/>
+              <a:lstStyle/>
+              <a:p>
+                <a:r>
+                  <a:rPr lang="en-CA">
+                    <a:noFill/>
+                  </a:rPr>
+                  <a:t> </a:t>
+                </a:r>
+              </a:p>
+            </p:txBody>
+          </p:sp>
+        </mc:Fallback>
+      </mc:AlternateContent>
     </p:spTree>
     <p:extLst>
       <p:ext uri="{BB962C8B-B14F-4D97-AF65-F5344CB8AC3E}">
-        <p14:creationId xmlns:p14="http://schemas.microsoft.com/office/powerpoint/2010/main" val="615439262"/>
+        <p14:creationId xmlns:p14="http://schemas.microsoft.com/office/powerpoint/2010/main" val="38947868"/>
       </p:ext>
     </p:extLst>
   </p:cSld>
@@ -7334,7 +7671,7 @@
           <p:cNvPr id="2" name="Titre 1">
             <a:extLst>
               <a:ext uri="{FF2B5EF4-FFF2-40B4-BE49-F238E27FC236}">
-                <a16:creationId xmlns:a16="http://schemas.microsoft.com/office/drawing/2014/main" id="{773A4E10-6AA3-4F5A-A2DD-FD8115F2A333}"/>
+                <a16:creationId xmlns:a16="http://schemas.microsoft.com/office/drawing/2014/main" id="{42734EF5-0052-43BE-9824-A13878B90F1F}"/>
               </a:ext>
             </a:extLst>
           </p:cNvPr>
@@ -7356,10 +7693,10 @@
       </p:sp>
       <p:pic>
         <p:nvPicPr>
-          <p:cNvPr id="5" name="Espace réservé du contenu 4">
-            <a:extLst>
-              <a:ext uri="{FF2B5EF4-FFF2-40B4-BE49-F238E27FC236}">
-                <a16:creationId xmlns:a16="http://schemas.microsoft.com/office/drawing/2014/main" id="{BF831146-18E7-431C-A8D7-AE7191E610CA}"/>
+          <p:cNvPr id="5" name="Espace réservé du contenu 4" descr="Une image contenant capture d’écran&#10;&#10;Description générée automatiquement">
+            <a:extLst>
+              <a:ext uri="{FF2B5EF4-FFF2-40B4-BE49-F238E27FC236}">
+                <a16:creationId xmlns:a16="http://schemas.microsoft.com/office/drawing/2014/main" id="{96765797-F901-483F-9638-B2E77ABA9C93}"/>
               </a:ext>
             </a:extLst>
           </p:cNvPr>
@@ -7384,15 +7721,15 @@
         </p:blipFill>
         <p:spPr>
           <a:xfrm>
-            <a:off x="413425" y="401319"/>
-            <a:ext cx="11372175" cy="6045201"/>
+            <a:off x="420617" y="406399"/>
+            <a:ext cx="11371334" cy="6054361"/>
           </a:xfrm>
         </p:spPr>
       </p:pic>
     </p:spTree>
     <p:extLst>
       <p:ext uri="{BB962C8B-B14F-4D97-AF65-F5344CB8AC3E}">
-        <p14:creationId xmlns:p14="http://schemas.microsoft.com/office/powerpoint/2010/main" val="680076676"/>
+        <p14:creationId xmlns:p14="http://schemas.microsoft.com/office/powerpoint/2010/main" val="615439262"/>
       </p:ext>
     </p:extLst>
   </p:cSld>
@@ -7727,7 +8064,7 @@
           <p:cNvPr id="2" name="Titre 1">
             <a:extLst>
               <a:ext uri="{FF2B5EF4-FFF2-40B4-BE49-F238E27FC236}">
-                <a16:creationId xmlns:a16="http://schemas.microsoft.com/office/drawing/2014/main" id="{7BF22E7E-5A4C-4541-B366-DB2C52AC3F37}"/>
+                <a16:creationId xmlns:a16="http://schemas.microsoft.com/office/drawing/2014/main" id="{773A4E10-6AA3-4F5A-A2DD-FD8115F2A333}"/>
               </a:ext>
             </a:extLst>
           </p:cNvPr>
@@ -7749,10 +8086,10 @@
       </p:sp>
       <p:pic>
         <p:nvPicPr>
-          <p:cNvPr id="5" name="Espace réservé du contenu 4" descr="Une image contenant capture d’écran, carte&#10;&#10;Description générée automatiquement">
-            <a:extLst>
-              <a:ext uri="{FF2B5EF4-FFF2-40B4-BE49-F238E27FC236}">
-                <a16:creationId xmlns:a16="http://schemas.microsoft.com/office/drawing/2014/main" id="{A88781FE-19CA-4A0F-BDE7-ADDB09B9970A}"/>
+          <p:cNvPr id="5" name="Espace réservé du contenu 4">
+            <a:extLst>
+              <a:ext uri="{FF2B5EF4-FFF2-40B4-BE49-F238E27FC236}">
+                <a16:creationId xmlns:a16="http://schemas.microsoft.com/office/drawing/2014/main" id="{BF831146-18E7-431C-A8D7-AE7191E610CA}"/>
               </a:ext>
             </a:extLst>
           </p:cNvPr>
@@ -7777,15 +8114,15 @@
         </p:blipFill>
         <p:spPr>
           <a:xfrm>
-            <a:off x="391022" y="404970"/>
-            <a:ext cx="11409818" cy="6046630"/>
+            <a:off x="413425" y="401319"/>
+            <a:ext cx="11372175" cy="6045201"/>
           </a:xfrm>
         </p:spPr>
       </p:pic>
     </p:spTree>
     <p:extLst>
       <p:ext uri="{BB962C8B-B14F-4D97-AF65-F5344CB8AC3E}">
-        <p14:creationId xmlns:p14="http://schemas.microsoft.com/office/powerpoint/2010/main" val="602111372"/>
+        <p14:creationId xmlns:p14="http://schemas.microsoft.com/office/powerpoint/2010/main" val="680076676"/>
       </p:ext>
     </p:extLst>
   </p:cSld>
@@ -7817,7 +8154,7 @@
           <p:cNvPr id="2" name="Titre 1">
             <a:extLst>
               <a:ext uri="{FF2B5EF4-FFF2-40B4-BE49-F238E27FC236}">
-                <a16:creationId xmlns:a16="http://schemas.microsoft.com/office/drawing/2014/main" id="{3E13ED08-A0A9-44FD-B62E-0392D7F8D782}"/>
+                <a16:creationId xmlns:a16="http://schemas.microsoft.com/office/drawing/2014/main" id="{7BF22E7E-5A4C-4541-B366-DB2C52AC3F37}"/>
               </a:ext>
             </a:extLst>
           </p:cNvPr>
@@ -7839,10 +8176,10 @@
       </p:sp>
       <p:pic>
         <p:nvPicPr>
-          <p:cNvPr id="5" name="Espace réservé du contenu 4" descr="Une image contenant capture d’écran&#10;&#10;Description générée automatiquement">
-            <a:extLst>
-              <a:ext uri="{FF2B5EF4-FFF2-40B4-BE49-F238E27FC236}">
-                <a16:creationId xmlns:a16="http://schemas.microsoft.com/office/drawing/2014/main" id="{89B134A6-B549-4875-99DC-A766F3BEF45A}"/>
+          <p:cNvPr id="5" name="Espace réservé du contenu 4" descr="Une image contenant capture d’écran, carte&#10;&#10;Description générée automatiquement">
+            <a:extLst>
+              <a:ext uri="{FF2B5EF4-FFF2-40B4-BE49-F238E27FC236}">
+                <a16:creationId xmlns:a16="http://schemas.microsoft.com/office/drawing/2014/main" id="{A88781FE-19CA-4A0F-BDE7-ADDB09B9970A}"/>
               </a:ext>
             </a:extLst>
           </p:cNvPr>
@@ -7867,15 +8204,15 @@
         </p:blipFill>
         <p:spPr>
           <a:xfrm>
-            <a:off x="457200" y="430951"/>
-            <a:ext cx="11277600" cy="6007949"/>
+            <a:off x="391022" y="404970"/>
+            <a:ext cx="11409818" cy="6046630"/>
           </a:xfrm>
         </p:spPr>
       </p:pic>
     </p:spTree>
     <p:extLst>
       <p:ext uri="{BB962C8B-B14F-4D97-AF65-F5344CB8AC3E}">
-        <p14:creationId xmlns:p14="http://schemas.microsoft.com/office/powerpoint/2010/main" val="518085413"/>
+        <p14:creationId xmlns:p14="http://schemas.microsoft.com/office/powerpoint/2010/main" val="602111372"/>
       </p:ext>
     </p:extLst>
   </p:cSld>
@@ -7907,7 +8244,7 @@
           <p:cNvPr id="2" name="Titre 1">
             <a:extLst>
               <a:ext uri="{FF2B5EF4-FFF2-40B4-BE49-F238E27FC236}">
-                <a16:creationId xmlns:a16="http://schemas.microsoft.com/office/drawing/2014/main" id="{3D41FECC-B744-4795-A994-6D9C708A0019}"/>
+                <a16:creationId xmlns:a16="http://schemas.microsoft.com/office/drawing/2014/main" id="{3E13ED08-A0A9-44FD-B62E-0392D7F8D782}"/>
               </a:ext>
             </a:extLst>
           </p:cNvPr>
@@ -7929,10 +8266,10 @@
       </p:sp>
       <p:pic>
         <p:nvPicPr>
-          <p:cNvPr id="5" name="Espace réservé du contenu 4">
-            <a:extLst>
-              <a:ext uri="{FF2B5EF4-FFF2-40B4-BE49-F238E27FC236}">
-                <a16:creationId xmlns:a16="http://schemas.microsoft.com/office/drawing/2014/main" id="{D887A651-5C7E-4782-B609-336036094297}"/>
+          <p:cNvPr id="5" name="Espace réservé du contenu 4" descr="Une image contenant capture d’écran&#10;&#10;Description générée automatiquement">
+            <a:extLst>
+              <a:ext uri="{FF2B5EF4-FFF2-40B4-BE49-F238E27FC236}">
+                <a16:creationId xmlns:a16="http://schemas.microsoft.com/office/drawing/2014/main" id="{89B134A6-B549-4875-99DC-A766F3BEF45A}"/>
               </a:ext>
             </a:extLst>
           </p:cNvPr>
@@ -7957,15 +8294,15 @@
         </p:blipFill>
         <p:spPr>
           <a:xfrm>
-            <a:off x="511025" y="435031"/>
-            <a:ext cx="11214250" cy="5968263"/>
+            <a:off x="457200" y="430951"/>
+            <a:ext cx="11277600" cy="6007949"/>
           </a:xfrm>
         </p:spPr>
       </p:pic>
     </p:spTree>
     <p:extLst>
       <p:ext uri="{BB962C8B-B14F-4D97-AF65-F5344CB8AC3E}">
-        <p14:creationId xmlns:p14="http://schemas.microsoft.com/office/powerpoint/2010/main" val="782010169"/>
+        <p14:creationId xmlns:p14="http://schemas.microsoft.com/office/powerpoint/2010/main" val="518085413"/>
       </p:ext>
     </p:extLst>
   </p:cSld>
@@ -7997,7 +8334,7 @@
           <p:cNvPr id="2" name="Titre 1">
             <a:extLst>
               <a:ext uri="{FF2B5EF4-FFF2-40B4-BE49-F238E27FC236}">
-                <a16:creationId xmlns:a16="http://schemas.microsoft.com/office/drawing/2014/main" id="{F6ECABA7-F827-460B-8FA3-C2E35A93330A}"/>
+                <a16:creationId xmlns:a16="http://schemas.microsoft.com/office/drawing/2014/main" id="{3D41FECC-B744-4795-A994-6D9C708A0019}"/>
               </a:ext>
             </a:extLst>
           </p:cNvPr>
@@ -8022,7 +8359,7 @@
           <p:cNvPr id="5" name="Espace réservé du contenu 4">
             <a:extLst>
               <a:ext uri="{FF2B5EF4-FFF2-40B4-BE49-F238E27FC236}">
-                <a16:creationId xmlns:a16="http://schemas.microsoft.com/office/drawing/2014/main" id="{54D13A60-00A8-4E64-A7E8-C8ED72CF4EF9}"/>
+                <a16:creationId xmlns:a16="http://schemas.microsoft.com/office/drawing/2014/main" id="{D887A651-5C7E-4782-B609-336036094297}"/>
               </a:ext>
             </a:extLst>
           </p:cNvPr>
@@ -8047,15 +8384,15 @@
         </p:blipFill>
         <p:spPr>
           <a:xfrm>
-            <a:off x="657588" y="438734"/>
-            <a:ext cx="10939326" cy="5973912"/>
+            <a:off x="511025" y="435031"/>
+            <a:ext cx="11214250" cy="5968263"/>
           </a:xfrm>
         </p:spPr>
       </p:pic>
     </p:spTree>
     <p:extLst>
       <p:ext uri="{BB962C8B-B14F-4D97-AF65-F5344CB8AC3E}">
-        <p14:creationId xmlns:p14="http://schemas.microsoft.com/office/powerpoint/2010/main" val="660287049"/>
+        <p14:creationId xmlns:p14="http://schemas.microsoft.com/office/powerpoint/2010/main" val="782010169"/>
       </p:ext>
     </p:extLst>
   </p:cSld>
@@ -8109,10 +8446,10 @@
       </p:sp>
       <p:pic>
         <p:nvPicPr>
-          <p:cNvPr id="7" name="Espace réservé du contenu 6" descr="Une image contenant texte&#10;&#10;Description générée automatiquement">
-            <a:extLst>
-              <a:ext uri="{FF2B5EF4-FFF2-40B4-BE49-F238E27FC236}">
-                <a16:creationId xmlns:a16="http://schemas.microsoft.com/office/drawing/2014/main" id="{EA427FA2-23F4-46CD-AC1A-D8995075484B}"/>
+          <p:cNvPr id="5" name="Espace réservé du contenu 4">
+            <a:extLst>
+              <a:ext uri="{FF2B5EF4-FFF2-40B4-BE49-F238E27FC236}">
+                <a16:creationId xmlns:a16="http://schemas.microsoft.com/office/drawing/2014/main" id="{54D13A60-00A8-4E64-A7E8-C8ED72CF4EF9}"/>
               </a:ext>
             </a:extLst>
           </p:cNvPr>
@@ -8137,15 +8474,15 @@
         </p:blipFill>
         <p:spPr>
           <a:xfrm>
-            <a:off x="418494" y="485775"/>
-            <a:ext cx="11355012" cy="5886450"/>
+            <a:off x="657588" y="438734"/>
+            <a:ext cx="10939326" cy="5973912"/>
           </a:xfrm>
         </p:spPr>
       </p:pic>
     </p:spTree>
     <p:extLst>
       <p:ext uri="{BB962C8B-B14F-4D97-AF65-F5344CB8AC3E}">
-        <p14:creationId xmlns:p14="http://schemas.microsoft.com/office/powerpoint/2010/main" val="1751043232"/>
+        <p14:creationId xmlns:p14="http://schemas.microsoft.com/office/powerpoint/2010/main" val="660287049"/>
       </p:ext>
     </p:extLst>
   </p:cSld>
@@ -8177,7 +8514,7 @@
           <p:cNvPr id="2" name="Titre 1">
             <a:extLst>
               <a:ext uri="{FF2B5EF4-FFF2-40B4-BE49-F238E27FC236}">
-                <a16:creationId xmlns:a16="http://schemas.microsoft.com/office/drawing/2014/main" id="{82B75B72-3D6A-4BD1-903F-AC7D3246AC74}"/>
+                <a16:creationId xmlns:a16="http://schemas.microsoft.com/office/drawing/2014/main" id="{F6ECABA7-F827-460B-8FA3-C2E35A93330A}"/>
               </a:ext>
             </a:extLst>
           </p:cNvPr>
@@ -8199,10 +8536,10 @@
       </p:sp>
       <p:pic>
         <p:nvPicPr>
-          <p:cNvPr id="5" name="Espace réservé du contenu 4" descr="Une image contenant capture d’écran&#10;&#10;Description générée automatiquement">
-            <a:extLst>
-              <a:ext uri="{FF2B5EF4-FFF2-40B4-BE49-F238E27FC236}">
-                <a16:creationId xmlns:a16="http://schemas.microsoft.com/office/drawing/2014/main" id="{43A3294A-5C84-4C77-9380-83DCA580B7A6}"/>
+          <p:cNvPr id="7" name="Espace réservé du contenu 6" descr="Une image contenant texte&#10;&#10;Description générée automatiquement">
+            <a:extLst>
+              <a:ext uri="{FF2B5EF4-FFF2-40B4-BE49-F238E27FC236}">
+                <a16:creationId xmlns:a16="http://schemas.microsoft.com/office/drawing/2014/main" id="{EA427FA2-23F4-46CD-AC1A-D8995075484B}"/>
               </a:ext>
             </a:extLst>
           </p:cNvPr>
@@ -8227,15 +8564,15 @@
         </p:blipFill>
         <p:spPr>
           <a:xfrm>
-            <a:off x="430560" y="453120"/>
-            <a:ext cx="11341791" cy="5890530"/>
+            <a:off x="418494" y="485775"/>
+            <a:ext cx="11355012" cy="5886450"/>
           </a:xfrm>
         </p:spPr>
       </p:pic>
     </p:spTree>
     <p:extLst>
       <p:ext uri="{BB962C8B-B14F-4D97-AF65-F5344CB8AC3E}">
-        <p14:creationId xmlns:p14="http://schemas.microsoft.com/office/powerpoint/2010/main" val="3886300781"/>
+        <p14:creationId xmlns:p14="http://schemas.microsoft.com/office/powerpoint/2010/main" val="1751043232"/>
       </p:ext>
     </p:extLst>
   </p:cSld>
@@ -8267,7 +8604,7 @@
           <p:cNvPr id="2" name="Titre 1">
             <a:extLst>
               <a:ext uri="{FF2B5EF4-FFF2-40B4-BE49-F238E27FC236}">
-                <a16:creationId xmlns:a16="http://schemas.microsoft.com/office/drawing/2014/main" id="{4DE2DCB7-FE74-442F-9CC2-8D8ECABFD3E8}"/>
+                <a16:creationId xmlns:a16="http://schemas.microsoft.com/office/drawing/2014/main" id="{82B75B72-3D6A-4BD1-903F-AC7D3246AC74}"/>
               </a:ext>
             </a:extLst>
           </p:cNvPr>
@@ -8283,45 +8620,49 @@
           <a:bodyPr/>
           <a:lstStyle/>
           <a:p>
-            <a:r>
-              <a:rPr lang="fr-CA" dirty="0">
-                <a:latin typeface="Segoe UI Semibold" panose="020B0702040204020203" pitchFamily="34" charset="0"/>
-                <a:cs typeface="Segoe UI Semibold" panose="020B0702040204020203" pitchFamily="34" charset="0"/>
-              </a:rPr>
-              <a:t>Solutions pour l’oscillateur anharmonique</a:t>
-            </a:r>
-          </a:p>
-        </p:txBody>
-      </p:sp>
-      <p:sp>
-        <p:nvSpPr>
-          <p:cNvPr id="3" name="Espace réservé du contenu 2">
-            <a:extLst>
-              <a:ext uri="{FF2B5EF4-FFF2-40B4-BE49-F238E27FC236}">
-                <a16:creationId xmlns:a16="http://schemas.microsoft.com/office/drawing/2014/main" id="{60C44EC2-559F-4CC2-8DC1-2226C758BF8A}"/>
-              </a:ext>
-            </a:extLst>
-          </p:cNvPr>
-          <p:cNvSpPr>
-            <a:spLocks noGrp="1"/>
-          </p:cNvSpPr>
+            <a:endParaRPr lang="fr-CA"/>
+          </a:p>
+        </p:txBody>
+      </p:sp>
+      <p:pic>
+        <p:nvPicPr>
+          <p:cNvPr id="5" name="Espace réservé du contenu 4" descr="Une image contenant capture d’écran&#10;&#10;Description générée automatiquement">
+            <a:extLst>
+              <a:ext uri="{FF2B5EF4-FFF2-40B4-BE49-F238E27FC236}">
+                <a16:creationId xmlns:a16="http://schemas.microsoft.com/office/drawing/2014/main" id="{43A3294A-5C84-4C77-9380-83DCA580B7A6}"/>
+              </a:ext>
+            </a:extLst>
+          </p:cNvPr>
+          <p:cNvPicPr>
+            <a:picLocks noGrp="1" noChangeAspect="1"/>
+          </p:cNvPicPr>
           <p:nvPr>
             <p:ph idx="1"/>
           </p:nvPr>
-        </p:nvSpPr>
-        <p:spPr/>
-        <p:txBody>
-          <a:bodyPr/>
-          <a:lstStyle/>
-          <a:p>
-            <a:endParaRPr lang="fr-CA" dirty="0"/>
-          </a:p>
-        </p:txBody>
-      </p:sp>
+        </p:nvPicPr>
+        <p:blipFill>
+          <a:blip r:embed="rId2">
+            <a:extLst>
+              <a:ext uri="{28A0092B-C50C-407E-A947-70E740481C1C}">
+                <a14:useLocalDpi xmlns:a14="http://schemas.microsoft.com/office/drawing/2010/main" val="0"/>
+              </a:ext>
+            </a:extLst>
+          </a:blip>
+          <a:stretch>
+            <a:fillRect/>
+          </a:stretch>
+        </p:blipFill>
+        <p:spPr>
+          <a:xfrm>
+            <a:off x="430560" y="453120"/>
+            <a:ext cx="11341791" cy="5890530"/>
+          </a:xfrm>
+        </p:spPr>
+      </p:pic>
     </p:spTree>
     <p:extLst>
       <p:ext uri="{BB962C8B-B14F-4D97-AF65-F5344CB8AC3E}">
-        <p14:creationId xmlns:p14="http://schemas.microsoft.com/office/powerpoint/2010/main" val="2449801709"/>
+        <p14:creationId xmlns:p14="http://schemas.microsoft.com/office/powerpoint/2010/main" val="3886300781"/>
       </p:ext>
     </p:extLst>
   </p:cSld>
@@ -8374,243 +8715,40 @@
                 <a:latin typeface="Segoe UI Semibold" panose="020B0702040204020203" pitchFamily="34" charset="0"/>
                 <a:cs typeface="Segoe UI Semibold" panose="020B0702040204020203" pitchFamily="34" charset="0"/>
               </a:rPr>
-              <a:t>Solutions approximatives: perturbations</a:t>
-            </a:r>
-          </a:p>
-        </p:txBody>
-      </p:sp>
-      <p:pic>
-        <p:nvPicPr>
-          <p:cNvPr id="4" name="Image 3">
-            <a:extLst>
-              <a:ext uri="{FF2B5EF4-FFF2-40B4-BE49-F238E27FC236}">
-                <a16:creationId xmlns:a16="http://schemas.microsoft.com/office/drawing/2014/main" id="{07F18835-066C-420C-918E-97D0CDE00B2F}"/>
-              </a:ext>
-            </a:extLst>
-          </p:cNvPr>
-          <p:cNvPicPr>
-            <a:picLocks noChangeAspect="1"/>
-          </p:cNvPicPr>
-          <p:nvPr/>
-        </p:nvPicPr>
-        <p:blipFill>
-          <a:blip r:embed="rId2">
-            <a:clrChange>
-              <a:clrFrom>
-                <a:srgbClr val="FFFFFF"/>
-              </a:clrFrom>
-              <a:clrTo>
-                <a:srgbClr val="FFFFFF">
-                  <a:alpha val="0"/>
-                </a:srgbClr>
-              </a:clrTo>
-            </a:clrChange>
-          </a:blip>
-          <a:stretch>
-            <a:fillRect/>
-          </a:stretch>
-        </p:blipFill>
-        <p:spPr>
-          <a:xfrm>
-            <a:off x="4638675" y="2212815"/>
-            <a:ext cx="2914650" cy="552450"/>
-          </a:xfrm>
-          <a:prstGeom prst="rect">
-            <a:avLst/>
-          </a:prstGeom>
-        </p:spPr>
-      </p:pic>
-      <p:pic>
-        <p:nvPicPr>
-          <p:cNvPr id="5" name="Image 4">
-            <a:extLst>
-              <a:ext uri="{FF2B5EF4-FFF2-40B4-BE49-F238E27FC236}">
-                <a16:creationId xmlns:a16="http://schemas.microsoft.com/office/drawing/2014/main" id="{35E388EE-307D-4671-882A-B4F027B02231}"/>
-              </a:ext>
-            </a:extLst>
-          </p:cNvPr>
-          <p:cNvPicPr>
-            <a:picLocks noChangeAspect="1"/>
-          </p:cNvPicPr>
-          <p:nvPr/>
-        </p:nvPicPr>
-        <p:blipFill>
-          <a:blip r:embed="rId3">
-            <a:clrChange>
-              <a:clrFrom>
-                <a:srgbClr val="FFFFFF"/>
-              </a:clrFrom>
-              <a:clrTo>
-                <a:srgbClr val="FFFFFF">
-                  <a:alpha val="0"/>
-                </a:srgbClr>
-              </a:clrTo>
-            </a:clrChange>
-          </a:blip>
-          <a:stretch>
-            <a:fillRect/>
-          </a:stretch>
-        </p:blipFill>
-        <p:spPr>
-          <a:xfrm>
-            <a:off x="2799289" y="3594284"/>
-            <a:ext cx="6915150" cy="704850"/>
-          </a:xfrm>
-          <a:prstGeom prst="rect">
-            <a:avLst/>
-          </a:prstGeom>
-        </p:spPr>
-      </p:pic>
-      <p:pic>
-        <p:nvPicPr>
-          <p:cNvPr id="6" name="Image 5">
-            <a:extLst>
-              <a:ext uri="{FF2B5EF4-FFF2-40B4-BE49-F238E27FC236}">
-                <a16:creationId xmlns:a16="http://schemas.microsoft.com/office/drawing/2014/main" id="{096F9F1F-EB44-41BB-AEDA-09916F5C331C}"/>
-              </a:ext>
-            </a:extLst>
-          </p:cNvPr>
-          <p:cNvPicPr>
-            <a:picLocks noChangeAspect="1"/>
-          </p:cNvPicPr>
-          <p:nvPr/>
-        </p:nvPicPr>
-        <p:blipFill>
-          <a:blip r:embed="rId4">
-            <a:clrChange>
-              <a:clrFrom>
-                <a:srgbClr val="FFFFFF"/>
-              </a:clrFrom>
-              <a:clrTo>
-                <a:srgbClr val="FFFFFF">
-                  <a:alpha val="0"/>
-                </a:srgbClr>
-              </a:clrTo>
-            </a:clrChange>
-          </a:blip>
-          <a:stretch>
-            <a:fillRect/>
-          </a:stretch>
-        </p:blipFill>
-        <p:spPr>
-          <a:xfrm>
-            <a:off x="3823227" y="5128154"/>
-            <a:ext cx="4867275" cy="638175"/>
-          </a:xfrm>
-          <a:prstGeom prst="rect">
-            <a:avLst/>
-          </a:prstGeom>
-        </p:spPr>
-      </p:pic>
-      <p:sp>
-        <p:nvSpPr>
-          <p:cNvPr id="3" name="ZoneTexte 2">
-            <a:extLst>
-              <a:ext uri="{FF2B5EF4-FFF2-40B4-BE49-F238E27FC236}">
-                <a16:creationId xmlns:a16="http://schemas.microsoft.com/office/drawing/2014/main" id="{C4D9321A-5553-45F4-BD18-77E9039FD148}"/>
-              </a:ext>
-            </a:extLst>
-          </p:cNvPr>
-          <p:cNvSpPr txBox="1"/>
-          <p:nvPr/>
-        </p:nvSpPr>
-        <p:spPr>
-          <a:xfrm>
-            <a:off x="1066800" y="1843483"/>
-            <a:ext cx="3686175" cy="369332"/>
-          </a:xfrm>
-          <a:prstGeom prst="rect">
-            <a:avLst/>
-          </a:prstGeom>
-          <a:noFill/>
-        </p:spPr>
-        <p:txBody>
-          <a:bodyPr wrap="square" rtlCol="0">
-            <a:spAutoFit/>
-          </a:bodyPr>
+              <a:t>Solutions pour l’oscillateur anharmonique</a:t>
+            </a:r>
+          </a:p>
+        </p:txBody>
+      </p:sp>
+      <p:sp>
+        <p:nvSpPr>
+          <p:cNvPr id="3" name="Espace réservé du contenu 2">
+            <a:extLst>
+              <a:ext uri="{FF2B5EF4-FFF2-40B4-BE49-F238E27FC236}">
+                <a16:creationId xmlns:a16="http://schemas.microsoft.com/office/drawing/2014/main" id="{60C44EC2-559F-4CC2-8DC1-2226C758BF8A}"/>
+              </a:ext>
+            </a:extLst>
+          </p:cNvPr>
+          <p:cNvSpPr>
+            <a:spLocks noGrp="1"/>
+          </p:cNvSpPr>
+          <p:nvPr>
+            <p:ph idx="1"/>
+          </p:nvPr>
+        </p:nvSpPr>
+        <p:spPr/>
+        <p:txBody>
+          <a:bodyPr/>
           <a:lstStyle/>
           <a:p>
-            <a:r>
-              <a:rPr lang="fr-CA" dirty="0"/>
-              <a:t>Si l’hamiltonien peut s’écrire comme</a:t>
-            </a:r>
-          </a:p>
-        </p:txBody>
-      </p:sp>
-      <p:sp>
-        <p:nvSpPr>
-          <p:cNvPr id="7" name="ZoneTexte 6">
-            <a:extLst>
-              <a:ext uri="{FF2B5EF4-FFF2-40B4-BE49-F238E27FC236}">
-                <a16:creationId xmlns:a16="http://schemas.microsoft.com/office/drawing/2014/main" id="{1432DEC1-3834-41ED-BED9-29E8A179FD01}"/>
-              </a:ext>
-            </a:extLst>
-          </p:cNvPr>
-          <p:cNvSpPr txBox="1"/>
-          <p:nvPr/>
-        </p:nvSpPr>
-        <p:spPr>
-          <a:xfrm>
-            <a:off x="1066800" y="2971322"/>
-            <a:ext cx="3686175" cy="369332"/>
-          </a:xfrm>
-          <a:prstGeom prst="rect">
-            <a:avLst/>
-          </a:prstGeom>
-          <a:noFill/>
-        </p:spPr>
-        <p:txBody>
-          <a:bodyPr wrap="square" rtlCol="0">
-            <a:spAutoFit/>
-          </a:bodyPr>
-          <a:lstStyle/>
-          <a:p>
-            <a:r>
-              <a:rPr lang="fr-CA" dirty="0"/>
-              <a:t>La solution aura la forme</a:t>
-            </a:r>
-          </a:p>
-        </p:txBody>
-      </p:sp>
-      <p:sp>
-        <p:nvSpPr>
-          <p:cNvPr id="8" name="ZoneTexte 7">
-            <a:extLst>
-              <a:ext uri="{FF2B5EF4-FFF2-40B4-BE49-F238E27FC236}">
-                <a16:creationId xmlns:a16="http://schemas.microsoft.com/office/drawing/2014/main" id="{0DBDA4F4-F6FB-478C-A3CC-97D692808C29}"/>
-              </a:ext>
-            </a:extLst>
-          </p:cNvPr>
-          <p:cNvSpPr txBox="1"/>
-          <p:nvPr/>
-        </p:nvSpPr>
-        <p:spPr>
-          <a:xfrm>
-            <a:off x="1066799" y="4628672"/>
-            <a:ext cx="3686175" cy="369332"/>
-          </a:xfrm>
-          <a:prstGeom prst="rect">
-            <a:avLst/>
-          </a:prstGeom>
-          <a:noFill/>
-        </p:spPr>
-        <p:txBody>
-          <a:bodyPr wrap="square" rtlCol="0">
-            <a:spAutoFit/>
-          </a:bodyPr>
-          <a:lstStyle/>
-          <a:p>
-            <a:r>
-              <a:rPr lang="fr-CA" dirty="0"/>
-              <a:t>Et l’énergie aura la  forme</a:t>
-            </a:r>
+            <a:endParaRPr lang="fr-CA" dirty="0"/>
           </a:p>
         </p:txBody>
       </p:sp>
     </p:spTree>
     <p:extLst>
       <p:ext uri="{BB962C8B-B14F-4D97-AF65-F5344CB8AC3E}">
-        <p14:creationId xmlns:p14="http://schemas.microsoft.com/office/powerpoint/2010/main" val="422302555"/>
+        <p14:creationId xmlns:p14="http://schemas.microsoft.com/office/powerpoint/2010/main" val="2449801709"/>
       </p:ext>
     </p:extLst>
   </p:cSld>
@@ -8670,10 +8808,10 @@
       </p:sp>
       <p:pic>
         <p:nvPicPr>
-          <p:cNvPr id="3" name="Image 2">
-            <a:extLst>
-              <a:ext uri="{FF2B5EF4-FFF2-40B4-BE49-F238E27FC236}">
-                <a16:creationId xmlns:a16="http://schemas.microsoft.com/office/drawing/2014/main" id="{FD068053-DA43-4DA1-8C2B-9C293EF0A0F8}"/>
+          <p:cNvPr id="4" name="Image 3">
+            <a:extLst>
+              <a:ext uri="{FF2B5EF4-FFF2-40B4-BE49-F238E27FC236}">
+                <a16:creationId xmlns:a16="http://schemas.microsoft.com/office/drawing/2014/main" id="{07F18835-066C-420C-918E-97D0CDE00B2F}"/>
               </a:ext>
             </a:extLst>
           </p:cNvPr>
@@ -8701,8 +8839,8 @@
         </p:blipFill>
         <p:spPr>
           <a:xfrm>
-            <a:off x="4471986" y="2522194"/>
-            <a:ext cx="3248025" cy="723900"/>
+            <a:off x="4638675" y="2212815"/>
+            <a:ext cx="2914650" cy="552450"/>
           </a:xfrm>
           <a:prstGeom prst="rect">
             <a:avLst/>
@@ -8711,10 +8849,10 @@
       </p:pic>
       <p:pic>
         <p:nvPicPr>
-          <p:cNvPr id="7" name="Image 6">
-            <a:extLst>
-              <a:ext uri="{FF2B5EF4-FFF2-40B4-BE49-F238E27FC236}">
-                <a16:creationId xmlns:a16="http://schemas.microsoft.com/office/drawing/2014/main" id="{A7DE497F-268B-4AFE-9C8E-66A481146C43}"/>
+          <p:cNvPr id="5" name="Image 4">
+            <a:extLst>
+              <a:ext uri="{FF2B5EF4-FFF2-40B4-BE49-F238E27FC236}">
+                <a16:creationId xmlns:a16="http://schemas.microsoft.com/office/drawing/2014/main" id="{35E388EE-307D-4671-882A-B4F027B02231}"/>
               </a:ext>
             </a:extLst>
           </p:cNvPr>
@@ -8742,20 +8880,61 @@
         </p:blipFill>
         <p:spPr>
           <a:xfrm>
-            <a:off x="3933824" y="4109694"/>
-            <a:ext cx="4324350" cy="1114425"/>
+            <a:off x="2799289" y="3594284"/>
+            <a:ext cx="6915150" cy="704850"/>
           </a:xfrm>
           <a:prstGeom prst="rect">
             <a:avLst/>
           </a:prstGeom>
         </p:spPr>
       </p:pic>
-      <p:sp>
-        <p:nvSpPr>
-          <p:cNvPr id="4" name="ZoneTexte 3">
-            <a:extLst>
-              <a:ext uri="{FF2B5EF4-FFF2-40B4-BE49-F238E27FC236}">
-                <a16:creationId xmlns:a16="http://schemas.microsoft.com/office/drawing/2014/main" id="{A75B7330-987A-464D-A68C-FA4D2BC91515}"/>
+      <p:pic>
+        <p:nvPicPr>
+          <p:cNvPr id="6" name="Image 5">
+            <a:extLst>
+              <a:ext uri="{FF2B5EF4-FFF2-40B4-BE49-F238E27FC236}">
+                <a16:creationId xmlns:a16="http://schemas.microsoft.com/office/drawing/2014/main" id="{096F9F1F-EB44-41BB-AEDA-09916F5C331C}"/>
+              </a:ext>
+            </a:extLst>
+          </p:cNvPr>
+          <p:cNvPicPr>
+            <a:picLocks noChangeAspect="1"/>
+          </p:cNvPicPr>
+          <p:nvPr/>
+        </p:nvPicPr>
+        <p:blipFill>
+          <a:blip r:embed="rId4">
+            <a:clrChange>
+              <a:clrFrom>
+                <a:srgbClr val="FFFFFF"/>
+              </a:clrFrom>
+              <a:clrTo>
+                <a:srgbClr val="FFFFFF">
+                  <a:alpha val="0"/>
+                </a:srgbClr>
+              </a:clrTo>
+            </a:clrChange>
+          </a:blip>
+          <a:stretch>
+            <a:fillRect/>
+          </a:stretch>
+        </p:blipFill>
+        <p:spPr>
+          <a:xfrm>
+            <a:off x="3823227" y="5128154"/>
+            <a:ext cx="4867275" cy="638175"/>
+          </a:xfrm>
+          <a:prstGeom prst="rect">
+            <a:avLst/>
+          </a:prstGeom>
+        </p:spPr>
+      </p:pic>
+      <p:sp>
+        <p:nvSpPr>
+          <p:cNvPr id="3" name="ZoneTexte 2">
+            <a:extLst>
+              <a:ext uri="{FF2B5EF4-FFF2-40B4-BE49-F238E27FC236}">
+                <a16:creationId xmlns:a16="http://schemas.microsoft.com/office/drawing/2014/main" id="{C4D9321A-5553-45F4-BD18-77E9039FD148}"/>
               </a:ext>
             </a:extLst>
           </p:cNvPr>
@@ -8764,8 +8943,8 @@
         </p:nvSpPr>
         <p:spPr>
           <a:xfrm>
-            <a:off x="1066800" y="1889549"/>
-            <a:ext cx="4829175" cy="369332"/>
+            <a:off x="1066800" y="1843483"/>
+            <a:ext cx="3686175" cy="369332"/>
           </a:xfrm>
           <a:prstGeom prst="rect">
             <a:avLst/>
@@ -8780,17 +8959,17 @@
           <a:p>
             <a:r>
               <a:rPr lang="fr-CA" dirty="0"/>
-              <a:t>La première correction sur l’énergie sera</a:t>
-            </a:r>
-          </a:p>
-        </p:txBody>
-      </p:sp>
-      <p:sp>
-        <p:nvSpPr>
-          <p:cNvPr id="8" name="ZoneTexte 7">
-            <a:extLst>
-              <a:ext uri="{FF2B5EF4-FFF2-40B4-BE49-F238E27FC236}">
-                <a16:creationId xmlns:a16="http://schemas.microsoft.com/office/drawing/2014/main" id="{DD97BE43-CE57-49A2-8E51-2F982848ABF6}"/>
+              <a:t>Si l’hamiltonien peut s’écrire comme</a:t>
+            </a:r>
+          </a:p>
+        </p:txBody>
+      </p:sp>
+      <p:sp>
+        <p:nvSpPr>
+          <p:cNvPr id="7" name="ZoneTexte 6">
+            <a:extLst>
+              <a:ext uri="{FF2B5EF4-FFF2-40B4-BE49-F238E27FC236}">
+                <a16:creationId xmlns:a16="http://schemas.microsoft.com/office/drawing/2014/main" id="{1432DEC1-3834-41ED-BED9-29E8A179FD01}"/>
               </a:ext>
             </a:extLst>
           </p:cNvPr>
@@ -8799,8 +8978,8 @@
         </p:nvSpPr>
         <p:spPr>
           <a:xfrm>
-            <a:off x="1066800" y="3569428"/>
-            <a:ext cx="4829175" cy="369332"/>
+            <a:off x="1066800" y="2971322"/>
+            <a:ext cx="3686175" cy="369332"/>
           </a:xfrm>
           <a:prstGeom prst="rect">
             <a:avLst/>
@@ -8815,7 +8994,42 @@
           <a:p>
             <a:r>
               <a:rPr lang="fr-CA" dirty="0"/>
-              <a:t>La première correction aux vecteurs propres est</a:t>
+              <a:t>La solution aura la forme</a:t>
+            </a:r>
+          </a:p>
+        </p:txBody>
+      </p:sp>
+      <p:sp>
+        <p:nvSpPr>
+          <p:cNvPr id="8" name="ZoneTexte 7">
+            <a:extLst>
+              <a:ext uri="{FF2B5EF4-FFF2-40B4-BE49-F238E27FC236}">
+                <a16:creationId xmlns:a16="http://schemas.microsoft.com/office/drawing/2014/main" id="{0DBDA4F4-F6FB-478C-A3CC-97D692808C29}"/>
+              </a:ext>
+            </a:extLst>
+          </p:cNvPr>
+          <p:cNvSpPr txBox="1"/>
+          <p:nvPr/>
+        </p:nvSpPr>
+        <p:spPr>
+          <a:xfrm>
+            <a:off x="1066799" y="4628672"/>
+            <a:ext cx="3686175" cy="369332"/>
+          </a:xfrm>
+          <a:prstGeom prst="rect">
+            <a:avLst/>
+          </a:prstGeom>
+          <a:noFill/>
+        </p:spPr>
+        <p:txBody>
+          <a:bodyPr wrap="square" rtlCol="0">
+            <a:spAutoFit/>
+          </a:bodyPr>
+          <a:lstStyle/>
+          <a:p>
+            <a:r>
+              <a:rPr lang="fr-CA" dirty="0"/>
+              <a:t>Et l’énergie aura la  forme</a:t>
             </a:r>
           </a:p>
         </p:txBody>
@@ -8823,7 +9037,7 @@
     </p:spTree>
     <p:extLst>
       <p:ext uri="{BB962C8B-B14F-4D97-AF65-F5344CB8AC3E}">
-        <p14:creationId xmlns:p14="http://schemas.microsoft.com/office/powerpoint/2010/main" val="1098673664"/>
+        <p14:creationId xmlns:p14="http://schemas.microsoft.com/office/powerpoint/2010/main" val="422302555"/>
       </p:ext>
     </p:extLst>
   </p:cSld>
@@ -8883,10 +9097,10 @@
       </p:sp>
       <p:pic>
         <p:nvPicPr>
-          <p:cNvPr id="4" name="Image 3">
-            <a:extLst>
-              <a:ext uri="{FF2B5EF4-FFF2-40B4-BE49-F238E27FC236}">
-                <a16:creationId xmlns:a16="http://schemas.microsoft.com/office/drawing/2014/main" id="{45D7B551-3FB3-4E68-993A-88DE5D70C115}"/>
+          <p:cNvPr id="3" name="Image 2">
+            <a:extLst>
+              <a:ext uri="{FF2B5EF4-FFF2-40B4-BE49-F238E27FC236}">
+                <a16:creationId xmlns:a16="http://schemas.microsoft.com/office/drawing/2014/main" id="{FD068053-DA43-4DA1-8C2B-9C293EF0A0F8}"/>
               </a:ext>
             </a:extLst>
           </p:cNvPr>
@@ -8914,8 +9128,8 @@
         </p:blipFill>
         <p:spPr>
           <a:xfrm>
-            <a:off x="4424359" y="2476857"/>
-            <a:ext cx="3343275" cy="533400"/>
+            <a:off x="4471986" y="2522194"/>
+            <a:ext cx="3248025" cy="723900"/>
           </a:xfrm>
           <a:prstGeom prst="rect">
             <a:avLst/>
@@ -8924,10 +9138,10 @@
       </p:pic>
       <p:pic>
         <p:nvPicPr>
-          <p:cNvPr id="5" name="Image 4">
-            <a:extLst>
-              <a:ext uri="{FF2B5EF4-FFF2-40B4-BE49-F238E27FC236}">
-                <a16:creationId xmlns:a16="http://schemas.microsoft.com/office/drawing/2014/main" id="{F226B24E-D890-47B7-9914-AFCFD18031BC}"/>
+          <p:cNvPr id="7" name="Image 6">
+            <a:extLst>
+              <a:ext uri="{FF2B5EF4-FFF2-40B4-BE49-F238E27FC236}">
+                <a16:creationId xmlns:a16="http://schemas.microsoft.com/office/drawing/2014/main" id="{A7DE497F-268B-4AFE-9C8E-66A481146C43}"/>
               </a:ext>
             </a:extLst>
           </p:cNvPr>
@@ -8955,8 +9169,8 @@
         </p:blipFill>
         <p:spPr>
           <a:xfrm>
-            <a:off x="3290883" y="4949295"/>
-            <a:ext cx="5610225" cy="1114425"/>
+            <a:off x="3933824" y="4109694"/>
+            <a:ext cx="4324350" cy="1114425"/>
           </a:xfrm>
           <a:prstGeom prst="rect">
             <a:avLst/>
@@ -8965,10 +9179,10 @@
       </p:pic>
       <p:sp>
         <p:nvSpPr>
-          <p:cNvPr id="7" name="ZoneTexte 6">
-            <a:extLst>
-              <a:ext uri="{FF2B5EF4-FFF2-40B4-BE49-F238E27FC236}">
-                <a16:creationId xmlns:a16="http://schemas.microsoft.com/office/drawing/2014/main" id="{BE387114-4D11-4268-BDFB-06651FAEDEB3}"/>
+          <p:cNvPr id="4" name="ZoneTexte 3">
+            <a:extLst>
+              <a:ext uri="{FF2B5EF4-FFF2-40B4-BE49-F238E27FC236}">
+                <a16:creationId xmlns:a16="http://schemas.microsoft.com/office/drawing/2014/main" id="{A75B7330-987A-464D-A68C-FA4D2BC91515}"/>
               </a:ext>
             </a:extLst>
           </p:cNvPr>
@@ -8977,8 +9191,8 @@
         </p:nvSpPr>
         <p:spPr>
           <a:xfrm>
-            <a:off x="1066800" y="2060859"/>
-            <a:ext cx="3976690" cy="369332"/>
+            <a:off x="1066800" y="1889549"/>
+            <a:ext cx="4829175" cy="369332"/>
           </a:xfrm>
           <a:prstGeom prst="rect">
             <a:avLst/>
@@ -8993,7 +9207,7 @@
           <a:p>
             <a:r>
               <a:rPr lang="fr-CA" dirty="0"/>
-              <a:t>Si l’hamiltonien peut s’écrire comme</a:t>
+              <a:t>La première correction sur l’énergie sera</a:t>
             </a:r>
           </a:p>
         </p:txBody>
@@ -9003,7 +9217,7 @@
           <p:cNvPr id="8" name="ZoneTexte 7">
             <a:extLst>
               <a:ext uri="{FF2B5EF4-FFF2-40B4-BE49-F238E27FC236}">
-                <a16:creationId xmlns:a16="http://schemas.microsoft.com/office/drawing/2014/main" id="{E59FE1B8-D657-4531-AEA6-65052B7D093B}"/>
+                <a16:creationId xmlns:a16="http://schemas.microsoft.com/office/drawing/2014/main" id="{DD97BE43-CE57-49A2-8E51-2F982848ABF6}"/>
               </a:ext>
             </a:extLst>
           </p:cNvPr>
@@ -9012,8 +9226,8 @@
         </p:nvSpPr>
         <p:spPr>
           <a:xfrm>
-            <a:off x="1066799" y="3247191"/>
-            <a:ext cx="5419725" cy="369332"/>
+            <a:off x="1066800" y="3569428"/>
+            <a:ext cx="4829175" cy="369332"/>
           </a:xfrm>
           <a:prstGeom prst="rect">
             <a:avLst/>
@@ -9028,72 +9242,7 @@
           <a:p>
             <a:r>
               <a:rPr lang="fr-CA" dirty="0"/>
-              <a:t>La première correction sur l’énergie sera encore</a:t>
-            </a:r>
-          </a:p>
-        </p:txBody>
-      </p:sp>
-      <p:pic>
-        <p:nvPicPr>
-          <p:cNvPr id="9" name="Image 8">
-            <a:extLst>
-              <a:ext uri="{FF2B5EF4-FFF2-40B4-BE49-F238E27FC236}">
-                <a16:creationId xmlns:a16="http://schemas.microsoft.com/office/drawing/2014/main" id="{08B1EAC3-5B58-4A00-86B8-CD48B19FA4E7}"/>
-              </a:ext>
-            </a:extLst>
-          </p:cNvPr>
-          <p:cNvPicPr>
-            <a:picLocks noChangeAspect="1"/>
-          </p:cNvPicPr>
-          <p:nvPr/>
-        </p:nvPicPr>
-        <p:blipFill>
-          <a:blip r:embed="rId4"/>
-          <a:stretch>
-            <a:fillRect/>
-          </a:stretch>
-        </p:blipFill>
-        <p:spPr>
-          <a:xfrm>
-            <a:off x="4662439" y="3680512"/>
-            <a:ext cx="2867112" cy="635938"/>
-          </a:xfrm>
-          <a:prstGeom prst="rect">
-            <a:avLst/>
-          </a:prstGeom>
-        </p:spPr>
-      </p:pic>
-      <p:sp>
-        <p:nvSpPr>
-          <p:cNvPr id="10" name="ZoneTexte 9">
-            <a:extLst>
-              <a:ext uri="{FF2B5EF4-FFF2-40B4-BE49-F238E27FC236}">
-                <a16:creationId xmlns:a16="http://schemas.microsoft.com/office/drawing/2014/main" id="{FB3EB5CB-C583-4910-9C16-FEB21CACD811}"/>
-              </a:ext>
-            </a:extLst>
-          </p:cNvPr>
-          <p:cNvSpPr txBox="1"/>
-          <p:nvPr/>
-        </p:nvSpPr>
-        <p:spPr>
-          <a:xfrm>
-            <a:off x="1066799" y="4480188"/>
-            <a:ext cx="6700835" cy="369332"/>
-          </a:xfrm>
-          <a:prstGeom prst="rect">
-            <a:avLst/>
-          </a:prstGeom>
-          <a:noFill/>
-        </p:spPr>
-        <p:txBody>
-          <a:bodyPr wrap="square" rtlCol="0">
-            <a:spAutoFit/>
-          </a:bodyPr>
-          <a:lstStyle/>
-          <a:p>
-            <a:r>
-              <a:rPr lang="fr-CA" dirty="0"/>
-              <a:t>Une seconde correction sur l’énergie est nécessaire dans ce cas-ci</a:t>
+              <a:t>La première correction aux vecteurs propres est</a:t>
             </a:r>
           </a:p>
         </p:txBody>
@@ -9101,7 +9250,7 @@
     </p:spTree>
     <p:extLst>
       <p:ext uri="{BB962C8B-B14F-4D97-AF65-F5344CB8AC3E}">
-        <p14:creationId xmlns:p14="http://schemas.microsoft.com/office/powerpoint/2010/main" val="3145349343"/>
+        <p14:creationId xmlns:p14="http://schemas.microsoft.com/office/powerpoint/2010/main" val="1098673664"/>
       </p:ext>
     </p:extLst>
   </p:cSld>
@@ -9394,6 +9543,284 @@
           </a:p>
         </p:txBody>
       </p:sp>
+      <p:pic>
+        <p:nvPicPr>
+          <p:cNvPr id="4" name="Image 3">
+            <a:extLst>
+              <a:ext uri="{FF2B5EF4-FFF2-40B4-BE49-F238E27FC236}">
+                <a16:creationId xmlns:a16="http://schemas.microsoft.com/office/drawing/2014/main" id="{45D7B551-3FB3-4E68-993A-88DE5D70C115}"/>
+              </a:ext>
+            </a:extLst>
+          </p:cNvPr>
+          <p:cNvPicPr>
+            <a:picLocks noChangeAspect="1"/>
+          </p:cNvPicPr>
+          <p:nvPr/>
+        </p:nvPicPr>
+        <p:blipFill>
+          <a:blip r:embed="rId2">
+            <a:clrChange>
+              <a:clrFrom>
+                <a:srgbClr val="FFFFFF"/>
+              </a:clrFrom>
+              <a:clrTo>
+                <a:srgbClr val="FFFFFF">
+                  <a:alpha val="0"/>
+                </a:srgbClr>
+              </a:clrTo>
+            </a:clrChange>
+          </a:blip>
+          <a:stretch>
+            <a:fillRect/>
+          </a:stretch>
+        </p:blipFill>
+        <p:spPr>
+          <a:xfrm>
+            <a:off x="4424359" y="2476857"/>
+            <a:ext cx="3343275" cy="533400"/>
+          </a:xfrm>
+          <a:prstGeom prst="rect">
+            <a:avLst/>
+          </a:prstGeom>
+        </p:spPr>
+      </p:pic>
+      <p:pic>
+        <p:nvPicPr>
+          <p:cNvPr id="5" name="Image 4">
+            <a:extLst>
+              <a:ext uri="{FF2B5EF4-FFF2-40B4-BE49-F238E27FC236}">
+                <a16:creationId xmlns:a16="http://schemas.microsoft.com/office/drawing/2014/main" id="{F226B24E-D890-47B7-9914-AFCFD18031BC}"/>
+              </a:ext>
+            </a:extLst>
+          </p:cNvPr>
+          <p:cNvPicPr>
+            <a:picLocks noChangeAspect="1"/>
+          </p:cNvPicPr>
+          <p:nvPr/>
+        </p:nvPicPr>
+        <p:blipFill>
+          <a:blip r:embed="rId3">
+            <a:clrChange>
+              <a:clrFrom>
+                <a:srgbClr val="FFFFFF"/>
+              </a:clrFrom>
+              <a:clrTo>
+                <a:srgbClr val="FFFFFF">
+                  <a:alpha val="0"/>
+                </a:srgbClr>
+              </a:clrTo>
+            </a:clrChange>
+          </a:blip>
+          <a:stretch>
+            <a:fillRect/>
+          </a:stretch>
+        </p:blipFill>
+        <p:spPr>
+          <a:xfrm>
+            <a:off x="3290883" y="4949295"/>
+            <a:ext cx="5610225" cy="1114425"/>
+          </a:xfrm>
+          <a:prstGeom prst="rect">
+            <a:avLst/>
+          </a:prstGeom>
+        </p:spPr>
+      </p:pic>
+      <p:sp>
+        <p:nvSpPr>
+          <p:cNvPr id="7" name="ZoneTexte 6">
+            <a:extLst>
+              <a:ext uri="{FF2B5EF4-FFF2-40B4-BE49-F238E27FC236}">
+                <a16:creationId xmlns:a16="http://schemas.microsoft.com/office/drawing/2014/main" id="{BE387114-4D11-4268-BDFB-06651FAEDEB3}"/>
+              </a:ext>
+            </a:extLst>
+          </p:cNvPr>
+          <p:cNvSpPr txBox="1"/>
+          <p:nvPr/>
+        </p:nvSpPr>
+        <p:spPr>
+          <a:xfrm>
+            <a:off x="1066800" y="2060859"/>
+            <a:ext cx="3976690" cy="369332"/>
+          </a:xfrm>
+          <a:prstGeom prst="rect">
+            <a:avLst/>
+          </a:prstGeom>
+          <a:noFill/>
+        </p:spPr>
+        <p:txBody>
+          <a:bodyPr wrap="square" rtlCol="0">
+            <a:spAutoFit/>
+          </a:bodyPr>
+          <a:lstStyle/>
+          <a:p>
+            <a:r>
+              <a:rPr lang="fr-CA" dirty="0"/>
+              <a:t>Si l’hamiltonien peut s’écrire comme</a:t>
+            </a:r>
+          </a:p>
+        </p:txBody>
+      </p:sp>
+      <p:sp>
+        <p:nvSpPr>
+          <p:cNvPr id="8" name="ZoneTexte 7">
+            <a:extLst>
+              <a:ext uri="{FF2B5EF4-FFF2-40B4-BE49-F238E27FC236}">
+                <a16:creationId xmlns:a16="http://schemas.microsoft.com/office/drawing/2014/main" id="{E59FE1B8-D657-4531-AEA6-65052B7D093B}"/>
+              </a:ext>
+            </a:extLst>
+          </p:cNvPr>
+          <p:cNvSpPr txBox="1"/>
+          <p:nvPr/>
+        </p:nvSpPr>
+        <p:spPr>
+          <a:xfrm>
+            <a:off x="1066799" y="3247191"/>
+            <a:ext cx="5419725" cy="369332"/>
+          </a:xfrm>
+          <a:prstGeom prst="rect">
+            <a:avLst/>
+          </a:prstGeom>
+          <a:noFill/>
+        </p:spPr>
+        <p:txBody>
+          <a:bodyPr wrap="square" rtlCol="0">
+            <a:spAutoFit/>
+          </a:bodyPr>
+          <a:lstStyle/>
+          <a:p>
+            <a:r>
+              <a:rPr lang="fr-CA" dirty="0"/>
+              <a:t>La première correction sur l’énergie sera encore</a:t>
+            </a:r>
+          </a:p>
+        </p:txBody>
+      </p:sp>
+      <p:pic>
+        <p:nvPicPr>
+          <p:cNvPr id="9" name="Image 8">
+            <a:extLst>
+              <a:ext uri="{FF2B5EF4-FFF2-40B4-BE49-F238E27FC236}">
+                <a16:creationId xmlns:a16="http://schemas.microsoft.com/office/drawing/2014/main" id="{08B1EAC3-5B58-4A00-86B8-CD48B19FA4E7}"/>
+              </a:ext>
+            </a:extLst>
+          </p:cNvPr>
+          <p:cNvPicPr>
+            <a:picLocks noChangeAspect="1"/>
+          </p:cNvPicPr>
+          <p:nvPr/>
+        </p:nvPicPr>
+        <p:blipFill>
+          <a:blip r:embed="rId4"/>
+          <a:stretch>
+            <a:fillRect/>
+          </a:stretch>
+        </p:blipFill>
+        <p:spPr>
+          <a:xfrm>
+            <a:off x="4662439" y="3680512"/>
+            <a:ext cx="2867112" cy="635938"/>
+          </a:xfrm>
+          <a:prstGeom prst="rect">
+            <a:avLst/>
+          </a:prstGeom>
+        </p:spPr>
+      </p:pic>
+      <p:sp>
+        <p:nvSpPr>
+          <p:cNvPr id="10" name="ZoneTexte 9">
+            <a:extLst>
+              <a:ext uri="{FF2B5EF4-FFF2-40B4-BE49-F238E27FC236}">
+                <a16:creationId xmlns:a16="http://schemas.microsoft.com/office/drawing/2014/main" id="{FB3EB5CB-C583-4910-9C16-FEB21CACD811}"/>
+              </a:ext>
+            </a:extLst>
+          </p:cNvPr>
+          <p:cNvSpPr txBox="1"/>
+          <p:nvPr/>
+        </p:nvSpPr>
+        <p:spPr>
+          <a:xfrm>
+            <a:off x="1066799" y="4480188"/>
+            <a:ext cx="6700835" cy="369332"/>
+          </a:xfrm>
+          <a:prstGeom prst="rect">
+            <a:avLst/>
+          </a:prstGeom>
+          <a:noFill/>
+        </p:spPr>
+        <p:txBody>
+          <a:bodyPr wrap="square" rtlCol="0">
+            <a:spAutoFit/>
+          </a:bodyPr>
+          <a:lstStyle/>
+          <a:p>
+            <a:r>
+              <a:rPr lang="fr-CA" dirty="0"/>
+              <a:t>Une seconde correction sur l’énergie est nécessaire dans ce cas-ci</a:t>
+            </a:r>
+          </a:p>
+        </p:txBody>
+      </p:sp>
+    </p:spTree>
+    <p:extLst>
+      <p:ext uri="{BB962C8B-B14F-4D97-AF65-F5344CB8AC3E}">
+        <p14:creationId xmlns:p14="http://schemas.microsoft.com/office/powerpoint/2010/main" val="3145349343"/>
+      </p:ext>
+    </p:extLst>
+  </p:cSld>
+  <p:clrMapOvr>
+    <a:masterClrMapping/>
+  </p:clrMapOvr>
+</p:sld>
+</file>
+
+<file path=ppt/slides/slide31.xml><?xml version="1.0" encoding="utf-8"?>
+<p:sld xmlns:a="http://schemas.openxmlformats.org/drawingml/2006/main" xmlns:r="http://schemas.openxmlformats.org/officeDocument/2006/relationships" xmlns:p="http://schemas.openxmlformats.org/presentationml/2006/main">
+  <p:cSld>
+    <p:spTree>
+      <p:nvGrpSpPr>
+        <p:cNvPr id="1" name=""/>
+        <p:cNvGrpSpPr/>
+        <p:nvPr/>
+      </p:nvGrpSpPr>
+      <p:grpSpPr>
+        <a:xfrm>
+          <a:off x="0" y="0"/>
+          <a:ext cx="0" cy="0"/>
+          <a:chOff x="0" y="0"/>
+          <a:chExt cx="0" cy="0"/>
+        </a:xfrm>
+      </p:grpSpPr>
+      <p:sp>
+        <p:nvSpPr>
+          <p:cNvPr id="2" name="Titre 1">
+            <a:extLst>
+              <a:ext uri="{FF2B5EF4-FFF2-40B4-BE49-F238E27FC236}">
+                <a16:creationId xmlns:a16="http://schemas.microsoft.com/office/drawing/2014/main" id="{4DE2DCB7-FE74-442F-9CC2-8D8ECABFD3E8}"/>
+              </a:ext>
+            </a:extLst>
+          </p:cNvPr>
+          <p:cNvSpPr>
+            <a:spLocks noGrp="1"/>
+          </p:cNvSpPr>
+          <p:nvPr>
+            <p:ph type="title"/>
+          </p:nvPr>
+        </p:nvSpPr>
+        <p:spPr/>
+        <p:txBody>
+          <a:bodyPr/>
+          <a:lstStyle/>
+          <a:p>
+            <a:r>
+              <a:rPr lang="fr-CA" dirty="0">
+                <a:latin typeface="Segoe UI Semibold" panose="020B0702040204020203" pitchFamily="34" charset="0"/>
+                <a:cs typeface="Segoe UI Semibold" panose="020B0702040204020203" pitchFamily="34" charset="0"/>
+              </a:rPr>
+              <a:t>Solutions approximatives: perturbations</a:t>
+            </a:r>
+          </a:p>
+        </p:txBody>
+      </p:sp>
       <p:sp>
         <p:nvSpPr>
           <p:cNvPr id="3" name="Espace réservé du contenu 2">
@@ -9569,7 +9996,7 @@
 </p:sld>
 </file>
 
-<file path=ppt/slides/slide31.xml><?xml version="1.0" encoding="utf-8"?>
+<file path=ppt/slides/slide32.xml><?xml version="1.0" encoding="utf-8"?>
 <p:sld xmlns:a="http://schemas.openxmlformats.org/drawingml/2006/main" xmlns:r="http://schemas.openxmlformats.org/officeDocument/2006/relationships" xmlns:p="http://schemas.openxmlformats.org/presentationml/2006/main">
   <p:cSld>
     <p:spTree>

</xml_diff>